<commit_message>
Included SQL injection hint in new.jsp
</commit_message>
<xml_diff>
--- a/docs/Software Development - CISSP.pptx
+++ b/docs/Software Development - CISSP.pptx
@@ -223,7 +223,7 @@
           <a:p>
             <a:fld id="{4479618F-C858-4DED-966E-9D4454ABF05F}" type="datetimeFigureOut">
               <a:rPr lang="en-US" smtClean="0"/>
-              <a:t>11/28/2017</a:t>
+              <a:t>11/27/2018</a:t>
             </a:fld>
             <a:endParaRPr lang="en-US"/>
           </a:p>
@@ -388,7 +388,7 @@
           <a:p>
             <a:fld id="{D190D2B4-3B5D-40DA-93BE-C4D5E2164FB1}" type="datetimeFigureOut">
               <a:rPr lang="en-US" smtClean="0"/>
-              <a:t>11/28/2017</a:t>
+              <a:t>11/27/2018</a:t>
             </a:fld>
             <a:endParaRPr lang="en-US"/>
           </a:p>
@@ -2633,7 +2633,7 @@
             <a:fld id="{B61BEF0D-F0BB-DE4B-95CE-6DB70DBA9567}" type="datetimeFigureOut">
               <a:rPr lang="en-US" smtClean="0"/>
               <a:pPr/>
-              <a:t>11/28/2017</a:t>
+              <a:t>11/27/2018</a:t>
             </a:fld>
             <a:endParaRPr lang="en-US" dirty="0"/>
           </a:p>
@@ -2931,7 +2931,7 @@
             <a:fld id="{B61BEF0D-F0BB-DE4B-95CE-6DB70DBA9567}" type="datetimeFigureOut">
               <a:rPr lang="en-US" smtClean="0"/>
               <a:pPr/>
-              <a:t>11/28/2017</a:t>
+              <a:t>11/27/2018</a:t>
             </a:fld>
             <a:endParaRPr lang="en-US" dirty="0"/>
           </a:p>
@@ -3181,7 +3181,7 @@
             <a:fld id="{B61BEF0D-F0BB-DE4B-95CE-6DB70DBA9567}" type="datetimeFigureOut">
               <a:rPr lang="en-US" smtClean="0"/>
               <a:pPr/>
-              <a:t>11/28/2017</a:t>
+              <a:t>11/27/2018</a:t>
             </a:fld>
             <a:endParaRPr lang="en-US" dirty="0"/>
           </a:p>
@@ -3719,7 +3719,7 @@
             <a:fld id="{B61BEF0D-F0BB-DE4B-95CE-6DB70DBA9567}" type="datetimeFigureOut">
               <a:rPr lang="en-US" smtClean="0"/>
               <a:pPr/>
-              <a:t>11/28/2017</a:t>
+              <a:t>11/27/2018</a:t>
             </a:fld>
             <a:endParaRPr lang="en-US" dirty="0"/>
           </a:p>
@@ -3969,7 +3969,7 @@
             <a:fld id="{B61BEF0D-F0BB-DE4B-95CE-6DB70DBA9567}" type="datetimeFigureOut">
               <a:rPr lang="en-US" smtClean="0"/>
               <a:pPr/>
-              <a:t>11/28/2017</a:t>
+              <a:t>11/27/2018</a:t>
             </a:fld>
             <a:endParaRPr lang="en-US" dirty="0"/>
           </a:p>
@@ -4514,7 +4514,7 @@
             <a:fld id="{B61BEF0D-F0BB-DE4B-95CE-6DB70DBA9567}" type="datetimeFigureOut">
               <a:rPr lang="en-US" smtClean="0"/>
               <a:pPr/>
-              <a:t>11/28/2017</a:t>
+              <a:t>11/27/2018</a:t>
             </a:fld>
             <a:endParaRPr lang="en-US" dirty="0"/>
           </a:p>
@@ -4826,7 +4826,7 @@
             <a:fld id="{B61BEF0D-F0BB-DE4B-95CE-6DB70DBA9567}" type="datetimeFigureOut">
               <a:rPr lang="en-US" smtClean="0"/>
               <a:pPr/>
-              <a:t>11/28/2017</a:t>
+              <a:t>11/27/2018</a:t>
             </a:fld>
             <a:endParaRPr lang="en-US" dirty="0"/>
           </a:p>
@@ -5003,7 +5003,7 @@
             <a:fld id="{B61BEF0D-F0BB-DE4B-95CE-6DB70DBA9567}" type="datetimeFigureOut">
               <a:rPr lang="en-US" smtClean="0"/>
               <a:pPr/>
-              <a:t>11/28/2017</a:t>
+              <a:t>11/27/2018</a:t>
             </a:fld>
             <a:endParaRPr lang="en-US" dirty="0"/>
           </a:p>
@@ -5185,7 +5185,7 @@
             <a:fld id="{B61BEF0D-F0BB-DE4B-95CE-6DB70DBA9567}" type="datetimeFigureOut">
               <a:rPr lang="en-US" smtClean="0"/>
               <a:pPr/>
-              <a:t>11/28/2017</a:t>
+              <a:t>11/27/2018</a:t>
             </a:fld>
             <a:endParaRPr lang="en-US" dirty="0"/>
           </a:p>
@@ -5362,7 +5362,7 @@
             <a:fld id="{B61BEF0D-F0BB-DE4B-95CE-6DB70DBA9567}" type="datetimeFigureOut">
               <a:rPr lang="en-US" smtClean="0"/>
               <a:pPr/>
-              <a:t>11/28/2017</a:t>
+              <a:t>11/27/2018</a:t>
             </a:fld>
             <a:endParaRPr lang="en-US" dirty="0"/>
           </a:p>
@@ -5610,7 +5610,7 @@
             <a:fld id="{B61BEF0D-F0BB-DE4B-95CE-6DB70DBA9567}" type="datetimeFigureOut">
               <a:rPr lang="en-US" smtClean="0"/>
               <a:pPr/>
-              <a:t>11/28/2017</a:t>
+              <a:t>11/27/2018</a:t>
             </a:fld>
             <a:endParaRPr lang="en-US" dirty="0"/>
           </a:p>
@@ -5909,7 +5909,7 @@
             <a:fld id="{B61BEF0D-F0BB-DE4B-95CE-6DB70DBA9567}" type="datetimeFigureOut">
               <a:rPr lang="en-US" smtClean="0"/>
               <a:pPr/>
-              <a:t>11/28/2017</a:t>
+              <a:t>11/27/2018</a:t>
             </a:fld>
             <a:endParaRPr lang="en-US" dirty="0"/>
           </a:p>
@@ -6341,7 +6341,7 @@
             <a:fld id="{B61BEF0D-F0BB-DE4B-95CE-6DB70DBA9567}" type="datetimeFigureOut">
               <a:rPr lang="en-US" smtClean="0"/>
               <a:pPr/>
-              <a:t>11/28/2017</a:t>
+              <a:t>11/27/2018</a:t>
             </a:fld>
             <a:endParaRPr lang="en-US" dirty="0"/>
           </a:p>
@@ -6461,7 +6461,7 @@
             <a:fld id="{B61BEF0D-F0BB-DE4B-95CE-6DB70DBA9567}" type="datetimeFigureOut">
               <a:rPr lang="en-US" smtClean="0"/>
               <a:pPr/>
-              <a:t>11/28/2017</a:t>
+              <a:t>11/27/2018</a:t>
             </a:fld>
             <a:endParaRPr lang="en-US" dirty="0"/>
           </a:p>
@@ -6558,7 +6558,7 @@
             <a:fld id="{B61BEF0D-F0BB-DE4B-95CE-6DB70DBA9567}" type="datetimeFigureOut">
               <a:rPr lang="en-US" smtClean="0"/>
               <a:pPr/>
-              <a:t>11/28/2017</a:t>
+              <a:t>11/27/2018</a:t>
             </a:fld>
             <a:endParaRPr lang="en-US" dirty="0"/>
           </a:p>
@@ -6843,7 +6843,7 @@
             <a:fld id="{B61BEF0D-F0BB-DE4B-95CE-6DB70DBA9567}" type="datetimeFigureOut">
               <a:rPr lang="en-US" smtClean="0"/>
               <a:pPr/>
-              <a:t>11/28/2017</a:t>
+              <a:t>11/27/2018</a:t>
             </a:fld>
             <a:endParaRPr lang="en-US" dirty="0"/>
           </a:p>
@@ -7136,7 +7136,7 @@
             <a:fld id="{B61BEF0D-F0BB-DE4B-95CE-6DB70DBA9567}" type="datetimeFigureOut">
               <a:rPr lang="en-US" smtClean="0"/>
               <a:pPr/>
-              <a:t>11/28/2017</a:t>
+              <a:t>11/27/2018</a:t>
             </a:fld>
             <a:endParaRPr lang="en-US" dirty="0"/>
           </a:p>
@@ -7375,7 +7375,7 @@
             <a:fld id="{B61BEF0D-F0BB-DE4B-95CE-6DB70DBA9567}" type="datetimeFigureOut">
               <a:rPr lang="en-US" smtClean="0"/>
               <a:pPr/>
-              <a:t>11/28/2017</a:t>
+              <a:t>11/27/2018</a:t>
             </a:fld>
             <a:endParaRPr lang="en-US" dirty="0"/>
           </a:p>
@@ -8124,7 +8124,7 @@
           <p:cNvPr id="5" name="Straight Connector 4">
             <a:extLst>
               <a:ext uri="{FF2B5EF4-FFF2-40B4-BE49-F238E27FC236}">
-                <a16:creationId xmlns="" xmlns:a16="http://schemas.microsoft.com/office/drawing/2014/main" id="{FA70666D-1B80-4090-B917-DAD4D31032A6}"/>
+                <a16:creationId xmlns:a16="http://schemas.microsoft.com/office/drawing/2014/main" xmlns="" id="{FA70666D-1B80-4090-B917-DAD4D31032A6}"/>
               </a:ext>
             </a:extLst>
           </p:cNvPr>
@@ -8577,7 +8577,7 @@
           <p:cNvPr id="5" name="Rectangle 4">
             <a:extLst>
               <a:ext uri="{FF2B5EF4-FFF2-40B4-BE49-F238E27FC236}">
-                <a16:creationId xmlns="" xmlns:a16="http://schemas.microsoft.com/office/drawing/2014/main" id="{4AFEE50C-D6BA-48BA-BD4F-0BC2A3027C0D}"/>
+                <a16:creationId xmlns:a16="http://schemas.microsoft.com/office/drawing/2014/main" xmlns="" id="{4AFEE50C-D6BA-48BA-BD4F-0BC2A3027C0D}"/>
               </a:ext>
             </a:extLst>
           </p:cNvPr>
@@ -8978,7 +8978,7 @@
           <p:cNvPr id="4" name="Rectangle 3">
             <a:extLst>
               <a:ext uri="{FF2B5EF4-FFF2-40B4-BE49-F238E27FC236}">
-                <a16:creationId xmlns="" xmlns:a16="http://schemas.microsoft.com/office/drawing/2014/main" id="{66F6E9EE-56AC-4C91-BCC8-B2AB79A38D83}"/>
+                <a16:creationId xmlns:a16="http://schemas.microsoft.com/office/drawing/2014/main" xmlns="" id="{66F6E9EE-56AC-4C91-BCC8-B2AB79A38D83}"/>
               </a:ext>
             </a:extLst>
           </p:cNvPr>
@@ -9923,7 +9923,7 @@
           <p:cNvPr id="4" name="Content Placeholder 2">
             <a:extLst>
               <a:ext uri="{FF2B5EF4-FFF2-40B4-BE49-F238E27FC236}">
-                <a16:creationId xmlns="" xmlns:a16="http://schemas.microsoft.com/office/drawing/2014/main" id="{444E3BA5-B9E7-4C01-9F37-A4ECB2434A43}"/>
+                <a16:creationId xmlns:a16="http://schemas.microsoft.com/office/drawing/2014/main" xmlns="" id="{444E3BA5-B9E7-4C01-9F37-A4ECB2434A43}"/>
               </a:ext>
             </a:extLst>
           </p:cNvPr>
@@ -10590,7 +10590,7 @@
           <p:cNvPr id="6" name="Straight Connector 5">
             <a:extLst>
               <a:ext uri="{FF2B5EF4-FFF2-40B4-BE49-F238E27FC236}">
-                <a16:creationId xmlns="" xmlns:a16="http://schemas.microsoft.com/office/drawing/2014/main" id="{F434FCDB-F4C3-4BE3-BD04-7944106B39DD}"/>
+                <a16:creationId xmlns:a16="http://schemas.microsoft.com/office/drawing/2014/main" xmlns="" id="{F434FCDB-F4C3-4BE3-BD04-7944106B39DD}"/>
               </a:ext>
             </a:extLst>
           </p:cNvPr>
@@ -10707,14 +10707,17 @@
           <a:p>
             <a:r>
               <a:rPr lang="en-US" sz="2400" dirty="0"/>
-              <a:t>Did anyone notice security flaws in the code?</a:t>
-            </a:r>
-          </a:p>
-          <a:p>
-            <a:r>
-              <a:rPr lang="en-US" sz="2400" dirty="0"/>
-              <a:t>Prizes</a:t>
-            </a:r>
+              <a:t>Did anyone notice security flaws in the </a:t>
+            </a:r>
+            <a:r>
+              <a:rPr lang="en-US" sz="2400"/>
+              <a:t>code</a:t>
+            </a:r>
+            <a:r>
+              <a:rPr lang="en-US" sz="2400" smtClean="0"/>
+              <a:t>?</a:t>
+            </a:r>
+            <a:endParaRPr lang="en-US" sz="2400" dirty="0"/>
           </a:p>
         </p:txBody>
       </p:sp>

</xml_diff>

<commit_message>
Updated slide and DAO to register DB class.
</commit_message>
<xml_diff>
--- a/docs/Software Development - CISSP.pptx
+++ b/docs/Software Development - CISSP.pptx
@@ -137,10 +137,6 @@
 </p:presentation>
 </file>
 
-<file path=ppt/revisionInfo.xml><?xml version="1.0" encoding="utf-8"?>
-<p1510:revInfo xmlns:a="http://schemas.openxmlformats.org/drawingml/2006/main" xmlns:r="http://schemas.openxmlformats.org/officeDocument/2006/relationships" xmlns:p1510="http://schemas.microsoft.com/office/powerpoint/2015/10/main"/>
-</file>
-
 <file path=ppt/handoutMasters/handoutMaster1.xml><?xml version="1.0" encoding="utf-8"?>
 <p:handoutMaster xmlns:a="http://schemas.openxmlformats.org/drawingml/2006/main" xmlns:r="http://schemas.openxmlformats.org/officeDocument/2006/relationships" xmlns:p="http://schemas.openxmlformats.org/presentationml/2006/main">
   <p:cSld>
@@ -223,7 +219,7 @@
           <a:p>
             <a:fld id="{4479618F-C858-4DED-966E-9D4454ABF05F}" type="datetimeFigureOut">
               <a:rPr lang="en-US" smtClean="0"/>
-              <a:t>11/27/2018</a:t>
+              <a:t>4/17/2019</a:t>
             </a:fld>
             <a:endParaRPr lang="en-US"/>
           </a:p>
@@ -388,7 +384,7 @@
           <a:p>
             <a:fld id="{D190D2B4-3B5D-40DA-93BE-C4D5E2164FB1}" type="datetimeFigureOut">
               <a:rPr lang="en-US" smtClean="0"/>
-              <a:t>11/27/2018</a:t>
+              <a:t>4/17/2019</a:t>
             </a:fld>
             <a:endParaRPr lang="en-US"/>
           </a:p>
@@ -868,11 +864,11 @@
           <a:lstStyle/>
           <a:p>
             <a:r>
-              <a:rPr lang="en-US" dirty="0" smtClean="0"/>
+              <a:rPr lang="en-US" dirty="0"/>
               <a:t>Start off in Notepad,</a:t>
             </a:r>
             <a:r>
-              <a:rPr lang="en-US" baseline="0" dirty="0" smtClean="0"/>
+              <a:rPr lang="en-US" baseline="0" dirty="0"/>
               <a:t> then shift to Notepad++</a:t>
             </a:r>
             <a:endParaRPr lang="en-US" dirty="0"/>
@@ -960,10 +956,9 @@
           <a:lstStyle/>
           <a:p>
             <a:r>
-              <a:rPr lang="en-US" dirty="0" smtClean="0"/>
+              <a:rPr lang="en-US" dirty="0"/>
               <a:t>HSQLDB Editor</a:t>
             </a:r>
-            <a:endParaRPr lang="en-US" dirty="0"/>
           </a:p>
         </p:txBody>
       </p:sp>
@@ -1048,25 +1043,25 @@
           <a:lstStyle/>
           <a:p>
             <a:r>
-              <a:rPr lang="en-US" dirty="0" smtClean="0"/>
+              <a:rPr lang="en-US" dirty="0"/>
               <a:t>Start with small examples of Java and Python.</a:t>
             </a:r>
           </a:p>
           <a:p>
             <a:r>
-              <a:rPr lang="en-US" dirty="0" smtClean="0"/>
+              <a:rPr lang="en-US" dirty="0"/>
               <a:t>Open up</a:t>
             </a:r>
             <a:r>
-              <a:rPr lang="en-US" baseline="0" dirty="0" smtClean="0"/>
+              <a:rPr lang="en-US" baseline="0" dirty="0"/>
               <a:t> project in </a:t>
             </a:r>
             <a:r>
-              <a:rPr lang="en-US" baseline="0" dirty="0" err="1" smtClean="0"/>
+              <a:rPr lang="en-US" baseline="0" dirty="0" err="1"/>
               <a:t>Netbeans</a:t>
             </a:r>
             <a:r>
-              <a:rPr lang="en-US" baseline="0" dirty="0" smtClean="0"/>
+              <a:rPr lang="en-US" baseline="0" dirty="0"/>
               <a:t> to show an IDE (Java)</a:t>
             </a:r>
             <a:endParaRPr lang="en-US" dirty="0"/>
@@ -1154,10 +1149,9 @@
           <a:lstStyle/>
           <a:p>
             <a:r>
-              <a:rPr lang="en-US" dirty="0" smtClean="0"/>
+              <a:rPr lang="en-US" dirty="0"/>
               <a:t>Show unit test from project.</a:t>
             </a:r>
-            <a:endParaRPr lang="en-US" dirty="0"/>
           </a:p>
         </p:txBody>
       </p:sp>
@@ -1326,36 +1320,36 @@
           <a:lstStyle/>
           <a:p>
             <a:r>
-              <a:rPr lang="en-US" dirty="0" smtClean="0"/>
+              <a:rPr lang="en-US" dirty="0"/>
               <a:t>Show </a:t>
             </a:r>
             <a:r>
-              <a:rPr lang="en-US" dirty="0" err="1" smtClean="0"/>
+              <a:rPr lang="en-US" dirty="0" err="1"/>
               <a:t>Git</a:t>
             </a:r>
             <a:r>
-              <a:rPr lang="en-US" baseline="0" dirty="0" smtClean="0"/>
+              <a:rPr lang="en-US" baseline="0" dirty="0"/>
               <a:t> and GitHub</a:t>
             </a:r>
           </a:p>
           <a:p>
             <a:r>
-              <a:rPr lang="en-US" baseline="0" dirty="0" smtClean="0"/>
+              <a:rPr lang="en-US" baseline="0" dirty="0"/>
               <a:t>Show Tomcat, but then use </a:t>
             </a:r>
             <a:r>
-              <a:rPr lang="en-US" baseline="0" dirty="0" err="1" smtClean="0"/>
+              <a:rPr lang="en-US" baseline="0" dirty="0" err="1"/>
               <a:t>mvn</a:t>
             </a:r>
             <a:r>
-              <a:rPr lang="en-US" baseline="0" dirty="0" smtClean="0"/>
+              <a:rPr lang="en-US" baseline="0" dirty="0"/>
               <a:t> </a:t>
             </a:r>
             <a:r>
-              <a:rPr lang="en-US" baseline="0" dirty="0" err="1" smtClean="0"/>
+              <a:rPr lang="en-US" baseline="0" dirty="0" err="1"/>
               <a:t>jetty:run</a:t>
             </a:r>
-            <a:endParaRPr lang="en-US" baseline="0" dirty="0" smtClean="0"/>
+            <a:endParaRPr lang="en-US" baseline="0" dirty="0"/>
           </a:p>
         </p:txBody>
       </p:sp>
@@ -1457,16 +1451,15 @@
               <a:defRPr/>
             </a:pPr>
             <a:r>
-              <a:rPr lang="en-US" baseline="0" dirty="0" smtClean="0"/>
+              <a:rPr lang="en-US" baseline="0" dirty="0"/>
               <a:t>Go through the code, action by action</a:t>
             </a:r>
           </a:p>
           <a:p>
             <a:r>
-              <a:rPr lang="en-US" dirty="0" smtClean="0"/>
+              <a:rPr lang="en-US" dirty="0"/>
               <a:t>Deploy to Amazon</a:t>
             </a:r>
-            <a:endParaRPr lang="en-US" dirty="0"/>
           </a:p>
         </p:txBody>
       </p:sp>
@@ -2633,7 +2626,7 @@
             <a:fld id="{B61BEF0D-F0BB-DE4B-95CE-6DB70DBA9567}" type="datetimeFigureOut">
               <a:rPr lang="en-US" smtClean="0"/>
               <a:pPr/>
-              <a:t>11/27/2018</a:t>
+              <a:t>4/17/2019</a:t>
             </a:fld>
             <a:endParaRPr lang="en-US" dirty="0"/>
           </a:p>
@@ -2931,7 +2924,7 @@
             <a:fld id="{B61BEF0D-F0BB-DE4B-95CE-6DB70DBA9567}" type="datetimeFigureOut">
               <a:rPr lang="en-US" smtClean="0"/>
               <a:pPr/>
-              <a:t>11/27/2018</a:t>
+              <a:t>4/17/2019</a:t>
             </a:fld>
             <a:endParaRPr lang="en-US" dirty="0"/>
           </a:p>
@@ -3181,7 +3174,7 @@
             <a:fld id="{B61BEF0D-F0BB-DE4B-95CE-6DB70DBA9567}" type="datetimeFigureOut">
               <a:rPr lang="en-US" smtClean="0"/>
               <a:pPr/>
-              <a:t>11/27/2018</a:t>
+              <a:t>4/17/2019</a:t>
             </a:fld>
             <a:endParaRPr lang="en-US" dirty="0"/>
           </a:p>
@@ -3719,7 +3712,7 @@
             <a:fld id="{B61BEF0D-F0BB-DE4B-95CE-6DB70DBA9567}" type="datetimeFigureOut">
               <a:rPr lang="en-US" smtClean="0"/>
               <a:pPr/>
-              <a:t>11/27/2018</a:t>
+              <a:t>4/17/2019</a:t>
             </a:fld>
             <a:endParaRPr lang="en-US" dirty="0"/>
           </a:p>
@@ -3969,7 +3962,7 @@
             <a:fld id="{B61BEF0D-F0BB-DE4B-95CE-6DB70DBA9567}" type="datetimeFigureOut">
               <a:rPr lang="en-US" smtClean="0"/>
               <a:pPr/>
-              <a:t>11/27/2018</a:t>
+              <a:t>4/17/2019</a:t>
             </a:fld>
             <a:endParaRPr lang="en-US" dirty="0"/>
           </a:p>
@@ -4514,7 +4507,7 @@
             <a:fld id="{B61BEF0D-F0BB-DE4B-95CE-6DB70DBA9567}" type="datetimeFigureOut">
               <a:rPr lang="en-US" smtClean="0"/>
               <a:pPr/>
-              <a:t>11/27/2018</a:t>
+              <a:t>4/17/2019</a:t>
             </a:fld>
             <a:endParaRPr lang="en-US" dirty="0"/>
           </a:p>
@@ -4826,7 +4819,7 @@
             <a:fld id="{B61BEF0D-F0BB-DE4B-95CE-6DB70DBA9567}" type="datetimeFigureOut">
               <a:rPr lang="en-US" smtClean="0"/>
               <a:pPr/>
-              <a:t>11/27/2018</a:t>
+              <a:t>4/17/2019</a:t>
             </a:fld>
             <a:endParaRPr lang="en-US" dirty="0"/>
           </a:p>
@@ -5003,7 +4996,7 @@
             <a:fld id="{B61BEF0D-F0BB-DE4B-95CE-6DB70DBA9567}" type="datetimeFigureOut">
               <a:rPr lang="en-US" smtClean="0"/>
               <a:pPr/>
-              <a:t>11/27/2018</a:t>
+              <a:t>4/17/2019</a:t>
             </a:fld>
             <a:endParaRPr lang="en-US" dirty="0"/>
           </a:p>
@@ -5185,7 +5178,7 @@
             <a:fld id="{B61BEF0D-F0BB-DE4B-95CE-6DB70DBA9567}" type="datetimeFigureOut">
               <a:rPr lang="en-US" smtClean="0"/>
               <a:pPr/>
-              <a:t>11/27/2018</a:t>
+              <a:t>4/17/2019</a:t>
             </a:fld>
             <a:endParaRPr lang="en-US" dirty="0"/>
           </a:p>
@@ -5362,7 +5355,7 @@
             <a:fld id="{B61BEF0D-F0BB-DE4B-95CE-6DB70DBA9567}" type="datetimeFigureOut">
               <a:rPr lang="en-US" smtClean="0"/>
               <a:pPr/>
-              <a:t>11/27/2018</a:t>
+              <a:t>4/17/2019</a:t>
             </a:fld>
             <a:endParaRPr lang="en-US" dirty="0"/>
           </a:p>
@@ -5610,7 +5603,7 @@
             <a:fld id="{B61BEF0D-F0BB-DE4B-95CE-6DB70DBA9567}" type="datetimeFigureOut">
               <a:rPr lang="en-US" smtClean="0"/>
               <a:pPr/>
-              <a:t>11/27/2018</a:t>
+              <a:t>4/17/2019</a:t>
             </a:fld>
             <a:endParaRPr lang="en-US" dirty="0"/>
           </a:p>
@@ -5909,7 +5902,7 @@
             <a:fld id="{B61BEF0D-F0BB-DE4B-95CE-6DB70DBA9567}" type="datetimeFigureOut">
               <a:rPr lang="en-US" smtClean="0"/>
               <a:pPr/>
-              <a:t>11/27/2018</a:t>
+              <a:t>4/17/2019</a:t>
             </a:fld>
             <a:endParaRPr lang="en-US" dirty="0"/>
           </a:p>
@@ -6341,7 +6334,7 @@
             <a:fld id="{B61BEF0D-F0BB-DE4B-95CE-6DB70DBA9567}" type="datetimeFigureOut">
               <a:rPr lang="en-US" smtClean="0"/>
               <a:pPr/>
-              <a:t>11/27/2018</a:t>
+              <a:t>4/17/2019</a:t>
             </a:fld>
             <a:endParaRPr lang="en-US" dirty="0"/>
           </a:p>
@@ -6461,7 +6454,7 @@
             <a:fld id="{B61BEF0D-F0BB-DE4B-95CE-6DB70DBA9567}" type="datetimeFigureOut">
               <a:rPr lang="en-US" smtClean="0"/>
               <a:pPr/>
-              <a:t>11/27/2018</a:t>
+              <a:t>4/17/2019</a:t>
             </a:fld>
             <a:endParaRPr lang="en-US" dirty="0"/>
           </a:p>
@@ -6558,7 +6551,7 @@
             <a:fld id="{B61BEF0D-F0BB-DE4B-95CE-6DB70DBA9567}" type="datetimeFigureOut">
               <a:rPr lang="en-US" smtClean="0"/>
               <a:pPr/>
-              <a:t>11/27/2018</a:t>
+              <a:t>4/17/2019</a:t>
             </a:fld>
             <a:endParaRPr lang="en-US" dirty="0"/>
           </a:p>
@@ -6843,7 +6836,7 @@
             <a:fld id="{B61BEF0D-F0BB-DE4B-95CE-6DB70DBA9567}" type="datetimeFigureOut">
               <a:rPr lang="en-US" smtClean="0"/>
               <a:pPr/>
-              <a:t>11/27/2018</a:t>
+              <a:t>4/17/2019</a:t>
             </a:fld>
             <a:endParaRPr lang="en-US" dirty="0"/>
           </a:p>
@@ -7136,7 +7129,7 @@
             <a:fld id="{B61BEF0D-F0BB-DE4B-95CE-6DB70DBA9567}" type="datetimeFigureOut">
               <a:rPr lang="en-US" smtClean="0"/>
               <a:pPr/>
-              <a:t>11/27/2018</a:t>
+              <a:t>4/17/2019</a:t>
             </a:fld>
             <a:endParaRPr lang="en-US" dirty="0"/>
           </a:p>
@@ -7375,7 +7368,7 @@
             <a:fld id="{B61BEF0D-F0BB-DE4B-95CE-6DB70DBA9567}" type="datetimeFigureOut">
               <a:rPr lang="en-US" smtClean="0"/>
               <a:pPr/>
-              <a:t>11/27/2018</a:t>
+              <a:t>4/17/2019</a:t>
             </a:fld>
             <a:endParaRPr lang="en-US" dirty="0"/>
           </a:p>
@@ -8124,7 +8117,7 @@
           <p:cNvPr id="5" name="Straight Connector 4">
             <a:extLst>
               <a:ext uri="{FF2B5EF4-FFF2-40B4-BE49-F238E27FC236}">
-                <a16:creationId xmlns:a16="http://schemas.microsoft.com/office/drawing/2014/main" xmlns="" id="{FA70666D-1B80-4090-B917-DAD4D31032A6}"/>
+                <a16:creationId xmlns:a16="http://schemas.microsoft.com/office/drawing/2014/main" id="{FA70666D-1B80-4090-B917-DAD4D31032A6}"/>
               </a:ext>
             </a:extLst>
           </p:cNvPr>
@@ -8165,13 +8158,6 @@
   <p:clrMapOvr>
     <a:masterClrMapping/>
   </p:clrMapOvr>
-  <p:timing>
-    <p:tnLst>
-      <p:par>
-        <p:cTn id="1" dur="indefinite" restart="never" nodeType="tmRoot"/>
-      </p:par>
-    </p:tnLst>
-  </p:timing>
 </p:sld>
 </file>
 
@@ -8577,7 +8563,7 @@
           <p:cNvPr id="5" name="Rectangle 4">
             <a:extLst>
               <a:ext uri="{FF2B5EF4-FFF2-40B4-BE49-F238E27FC236}">
-                <a16:creationId xmlns:a16="http://schemas.microsoft.com/office/drawing/2014/main" xmlns="" id="{4AFEE50C-D6BA-48BA-BD4F-0BC2A3027C0D}"/>
+                <a16:creationId xmlns:a16="http://schemas.microsoft.com/office/drawing/2014/main" id="{4AFEE50C-D6BA-48BA-BD4F-0BC2A3027C0D}"/>
               </a:ext>
             </a:extLst>
           </p:cNvPr>
@@ -8978,7 +8964,7 @@
           <p:cNvPr id="4" name="Rectangle 3">
             <a:extLst>
               <a:ext uri="{FF2B5EF4-FFF2-40B4-BE49-F238E27FC236}">
-                <a16:creationId xmlns:a16="http://schemas.microsoft.com/office/drawing/2014/main" xmlns="" id="{66F6E9EE-56AC-4C91-BCC8-B2AB79A38D83}"/>
+                <a16:creationId xmlns:a16="http://schemas.microsoft.com/office/drawing/2014/main" id="{66F6E9EE-56AC-4C91-BCC8-B2AB79A38D83}"/>
               </a:ext>
             </a:extLst>
           </p:cNvPr>
@@ -9923,7 +9909,7 @@
           <p:cNvPr id="4" name="Content Placeholder 2">
             <a:extLst>
               <a:ext uri="{FF2B5EF4-FFF2-40B4-BE49-F238E27FC236}">
-                <a16:creationId xmlns:a16="http://schemas.microsoft.com/office/drawing/2014/main" xmlns="" id="{444E3BA5-B9E7-4C01-9F37-A4ECB2434A43}"/>
+                <a16:creationId xmlns:a16="http://schemas.microsoft.com/office/drawing/2014/main" id="{444E3BA5-B9E7-4C01-9F37-A4ECB2434A43}"/>
               </a:ext>
             </a:extLst>
           </p:cNvPr>
@@ -10590,7 +10576,7 @@
           <p:cNvPr id="6" name="Straight Connector 5">
             <a:extLst>
               <a:ext uri="{FF2B5EF4-FFF2-40B4-BE49-F238E27FC236}">
-                <a16:creationId xmlns:a16="http://schemas.microsoft.com/office/drawing/2014/main" xmlns="" id="{F434FCDB-F4C3-4BE3-BD04-7944106B39DD}"/>
+                <a16:creationId xmlns:a16="http://schemas.microsoft.com/office/drawing/2014/main" id="{F434FCDB-F4C3-4BE3-BD04-7944106B39DD}"/>
               </a:ext>
             </a:extLst>
           </p:cNvPr>
@@ -10707,17 +10693,46 @@
           <a:p>
             <a:r>
               <a:rPr lang="en-US" sz="2400" dirty="0"/>
-              <a:t>Did anyone notice security flaws in the </a:t>
-            </a:r>
-            <a:r>
-              <a:rPr lang="en-US" sz="2400"/>
-              <a:t>code</a:t>
-            </a:r>
-            <a:r>
-              <a:rPr lang="en-US" sz="2400" smtClean="0"/>
-              <a:t>?</a:t>
-            </a:r>
-            <a:endParaRPr lang="en-US" sz="2400" dirty="0"/>
+              <a:t>Did anyone notice security flaws in the code?</a:t>
+            </a:r>
+          </a:p>
+        </p:txBody>
+      </p:sp>
+      <p:sp>
+        <p:nvSpPr>
+          <p:cNvPr id="4" name="Rectangle 3">
+            <a:extLst>
+              <a:ext uri="{FF2B5EF4-FFF2-40B4-BE49-F238E27FC236}">
+                <a16:creationId xmlns:a16="http://schemas.microsoft.com/office/drawing/2014/main" id="{C46656C9-4941-4E23-8CF7-3906C8A09F46}"/>
+              </a:ext>
+            </a:extLst>
+          </p:cNvPr>
+          <p:cNvSpPr/>
+          <p:nvPr/>
+        </p:nvSpPr>
+        <p:spPr>
+          <a:xfrm>
+            <a:off x="4178663" y="5421868"/>
+            <a:ext cx="3831498" cy="369332"/>
+          </a:xfrm>
+          <a:prstGeom prst="rect">
+            <a:avLst/>
+          </a:prstGeom>
+        </p:spPr>
+        <p:txBody>
+          <a:bodyPr wrap="none">
+            <a:spAutoFit/>
+          </a:bodyPr>
+          <a:lstStyle/>
+          <a:p>
+            <a:r>
+              <a:rPr lang="en-US" dirty="0">
+                <a:solidFill>
+                  <a:schemeClr val="bg2"/>
+                </a:solidFill>
+              </a:rPr>
+              <a:t>description'; delete from items; --</a:t>
+            </a:r>
           </a:p>
         </p:txBody>
       </p:sp>
@@ -10959,13 +10974,6 @@
   <p:clrMapOvr>
     <a:masterClrMapping/>
   </p:clrMapOvr>
-  <p:timing>
-    <p:tnLst>
-      <p:par>
-        <p:cTn id="1" dur="indefinite" restart="never" nodeType="tmRoot"/>
-      </p:par>
-    </p:tnLst>
-  </p:timing>
 </p:sld>
 </file>
 

</xml_diff>